<commit_message>
Actualizar gráficos del documento final
</commit_message>
<xml_diff>
--- a/docs/LSTM.pptx
+++ b/docs/LSTM.pptx
@@ -6,6 +6,7 @@
   </p:sldMasterIdLst>
   <p:sldIdLst>
     <p:sldId id="256" r:id="rId2"/>
+    <p:sldId id="257" r:id="rId3"/>
   </p:sldIdLst>
   <p:sldSz cx="12192000" cy="6858000"/>
   <p:notesSz cx="6858000" cy="9144000"/>
@@ -261,7 +262,7 @@
           <a:p>
             <a:fld id="{0FEF0383-B892-43A7-8E80-74A67C740698}" type="datetimeFigureOut">
               <a:rPr lang="en-GB" smtClean="0"/>
-              <a:t>06/09/2023</a:t>
+              <a:t>19/09/2023</a:t>
             </a:fld>
             <a:endParaRPr lang="en-GB"/>
           </a:p>
@@ -461,7 +462,7 @@
           <a:p>
             <a:fld id="{0FEF0383-B892-43A7-8E80-74A67C740698}" type="datetimeFigureOut">
               <a:rPr lang="en-GB" smtClean="0"/>
-              <a:t>06/09/2023</a:t>
+              <a:t>19/09/2023</a:t>
             </a:fld>
             <a:endParaRPr lang="en-GB"/>
           </a:p>
@@ -671,7 +672,7 @@
           <a:p>
             <a:fld id="{0FEF0383-B892-43A7-8E80-74A67C740698}" type="datetimeFigureOut">
               <a:rPr lang="en-GB" smtClean="0"/>
-              <a:t>06/09/2023</a:t>
+              <a:t>19/09/2023</a:t>
             </a:fld>
             <a:endParaRPr lang="en-GB"/>
           </a:p>
@@ -871,7 +872,7 @@
           <a:p>
             <a:fld id="{0FEF0383-B892-43A7-8E80-74A67C740698}" type="datetimeFigureOut">
               <a:rPr lang="en-GB" smtClean="0"/>
-              <a:t>06/09/2023</a:t>
+              <a:t>19/09/2023</a:t>
             </a:fld>
             <a:endParaRPr lang="en-GB"/>
           </a:p>
@@ -1147,7 +1148,7 @@
           <a:p>
             <a:fld id="{0FEF0383-B892-43A7-8E80-74A67C740698}" type="datetimeFigureOut">
               <a:rPr lang="en-GB" smtClean="0"/>
-              <a:t>06/09/2023</a:t>
+              <a:t>19/09/2023</a:t>
             </a:fld>
             <a:endParaRPr lang="en-GB"/>
           </a:p>
@@ -1415,7 +1416,7 @@
           <a:p>
             <a:fld id="{0FEF0383-B892-43A7-8E80-74A67C740698}" type="datetimeFigureOut">
               <a:rPr lang="en-GB" smtClean="0"/>
-              <a:t>06/09/2023</a:t>
+              <a:t>19/09/2023</a:t>
             </a:fld>
             <a:endParaRPr lang="en-GB"/>
           </a:p>
@@ -1830,7 +1831,7 @@
           <a:p>
             <a:fld id="{0FEF0383-B892-43A7-8E80-74A67C740698}" type="datetimeFigureOut">
               <a:rPr lang="en-GB" smtClean="0"/>
-              <a:t>06/09/2023</a:t>
+              <a:t>19/09/2023</a:t>
             </a:fld>
             <a:endParaRPr lang="en-GB"/>
           </a:p>
@@ -1972,7 +1973,7 @@
           <a:p>
             <a:fld id="{0FEF0383-B892-43A7-8E80-74A67C740698}" type="datetimeFigureOut">
               <a:rPr lang="en-GB" smtClean="0"/>
-              <a:t>06/09/2023</a:t>
+              <a:t>19/09/2023</a:t>
             </a:fld>
             <a:endParaRPr lang="en-GB"/>
           </a:p>
@@ -2085,7 +2086,7 @@
           <a:p>
             <a:fld id="{0FEF0383-B892-43A7-8E80-74A67C740698}" type="datetimeFigureOut">
               <a:rPr lang="en-GB" smtClean="0"/>
-              <a:t>06/09/2023</a:t>
+              <a:t>19/09/2023</a:t>
             </a:fld>
             <a:endParaRPr lang="en-GB"/>
           </a:p>
@@ -2398,7 +2399,7 @@
           <a:p>
             <a:fld id="{0FEF0383-B892-43A7-8E80-74A67C740698}" type="datetimeFigureOut">
               <a:rPr lang="en-GB" smtClean="0"/>
-              <a:t>06/09/2023</a:t>
+              <a:t>19/09/2023</a:t>
             </a:fld>
             <a:endParaRPr lang="en-GB"/>
           </a:p>
@@ -2687,7 +2688,7 @@
           <a:p>
             <a:fld id="{0FEF0383-B892-43A7-8E80-74A67C740698}" type="datetimeFigureOut">
               <a:rPr lang="en-GB" smtClean="0"/>
-              <a:t>06/09/2023</a:t>
+              <a:t>19/09/2023</a:t>
             </a:fld>
             <a:endParaRPr lang="en-GB"/>
           </a:p>
@@ -2930,7 +2931,7 @@
           <a:p>
             <a:fld id="{0FEF0383-B892-43A7-8E80-74A67C740698}" type="datetimeFigureOut">
               <a:rPr lang="en-GB" smtClean="0"/>
-              <a:t>06/09/2023</a:t>
+              <a:t>19/09/2023</a:t>
             </a:fld>
             <a:endParaRPr lang="en-GB"/>
           </a:p>
@@ -6036,16 +6037,6 @@
             <a:off x="6911079" y="461753"/>
             <a:ext cx="1239670" cy="446089"/>
           </a:xfrm>
-          <a:prstGeom prst="callout2">
-            <a:avLst>
-              <a:gd name="adj1" fmla="val 18750"/>
-              <a:gd name="adj2" fmla="val -8333"/>
-              <a:gd name="adj3" fmla="val 18750"/>
-              <a:gd name="adj4" fmla="val -16667"/>
-              <a:gd name="adj5" fmla="val 285238"/>
-              <a:gd name="adj6" fmla="val -65494"/>
-            </a:avLst>
-          </a:prstGeom>
           <a:noFill/>
           <a:ln>
             <a:solidFill>
@@ -6054,15 +6045,6 @@
               </a:schemeClr>
             </a:solidFill>
             <a:tailEnd type="stealth" w="med" len="lg"/>
-            <a:extLst>
-              <a:ext uri="{C807C97D-BFC1-408E-A445-0C87EB9F89A2}">
-                <ask:lineSketchStyleProps xmlns:ask="http://schemas.microsoft.com/office/drawing/2018/sketchyshapes">
-                  <ask:type>
-                    <ask:lineSketchFreehand/>
-                  </ask:type>
-                </ask:lineSketchStyleProps>
-              </a:ext>
-            </a:extLst>
           </a:ln>
         </p:spPr>
         <p:style>
@@ -6514,6 +6496,1448 @@
     <p:extLst>
       <p:ext uri="{BB962C8B-B14F-4D97-AF65-F5344CB8AC3E}">
         <p14:creationId xmlns:p14="http://schemas.microsoft.com/office/powerpoint/2010/main" val="3684884756"/>
+      </p:ext>
+    </p:extLst>
+  </p:cSld>
+  <p:clrMapOvr>
+    <a:masterClrMapping/>
+  </p:clrMapOvr>
+</p:sld>
+</file>
+
+<file path=ppt/slides/slide2.xml><?xml version="1.0" encoding="utf-8"?>
+<p:sld xmlns:a="http://schemas.openxmlformats.org/drawingml/2006/main" xmlns:r="http://schemas.openxmlformats.org/officeDocument/2006/relationships" xmlns:p="http://schemas.openxmlformats.org/presentationml/2006/main">
+  <p:cSld>
+    <p:spTree>
+      <p:nvGrpSpPr>
+        <p:cNvPr id="1" name=""/>
+        <p:cNvGrpSpPr/>
+        <p:nvPr/>
+      </p:nvGrpSpPr>
+      <p:grpSpPr>
+        <a:xfrm>
+          <a:off x="0" y="0"/>
+          <a:ext cx="0" cy="0"/>
+          <a:chOff x="0" y="0"/>
+          <a:chExt cx="0" cy="0"/>
+        </a:xfrm>
+      </p:grpSpPr>
+      <p:sp>
+        <p:nvSpPr>
+          <p:cNvPr id="34" name="Globo: línea doblada sin borde 33">
+            <a:extLst>
+              <a:ext uri="{FF2B5EF4-FFF2-40B4-BE49-F238E27FC236}">
+                <a16:creationId xmlns:a16="http://schemas.microsoft.com/office/drawing/2014/main" id="{10933BB0-5CC1-0EF9-3459-B51E06AEB8FE}"/>
+              </a:ext>
+            </a:extLst>
+          </p:cNvPr>
+          <p:cNvSpPr/>
+          <p:nvPr/>
+        </p:nvSpPr>
+        <p:spPr>
+          <a:xfrm>
+            <a:off x="6911079" y="461753"/>
+            <a:ext cx="1239670" cy="446089"/>
+          </a:xfrm>
+          <a:noFill/>
+          <a:ln>
+            <a:solidFill>
+              <a:schemeClr val="accent4">
+                <a:lumMod val="75000"/>
+              </a:schemeClr>
+            </a:solidFill>
+            <a:tailEnd type="stealth" w="med" len="lg"/>
+          </a:ln>
+        </p:spPr>
+        <p:style>
+          <a:lnRef idx="2">
+            <a:schemeClr val="accent1">
+              <a:shade val="15000"/>
+            </a:schemeClr>
+          </a:lnRef>
+          <a:fillRef idx="1">
+            <a:schemeClr val="accent1"/>
+          </a:fillRef>
+          <a:effectRef idx="0">
+            <a:schemeClr val="accent1"/>
+          </a:effectRef>
+          <a:fontRef idx="minor">
+            <a:schemeClr val="lt1"/>
+          </a:fontRef>
+        </p:style>
+        <p:txBody>
+          <a:bodyPr lIns="36000" tIns="36000" rIns="36000" bIns="36000" rtlCol="0" anchor="ctr"/>
+          <a:lstStyle/>
+          <a:p>
+            <a:r>
+              <a:rPr lang="es-ES" dirty="0" err="1">
+                <a:solidFill>
+                  <a:schemeClr val="accent4">
+                    <a:lumMod val="75000"/>
+                  </a:schemeClr>
+                </a:solidFill>
+              </a:rPr>
+              <a:t>remember</a:t>
+            </a:r>
+            <a:r>
+              <a:rPr lang="es-ES" dirty="0">
+                <a:solidFill>
+                  <a:schemeClr val="accent4">
+                    <a:lumMod val="75000"/>
+                  </a:schemeClr>
+                </a:solidFill>
+              </a:rPr>
+              <a:t> </a:t>
+            </a:r>
+            <a:r>
+              <a:rPr lang="es-ES" dirty="0" err="1">
+                <a:solidFill>
+                  <a:schemeClr val="accent4">
+                    <a:lumMod val="75000"/>
+                  </a:schemeClr>
+                </a:solidFill>
+              </a:rPr>
+              <a:t>gte</a:t>
+            </a:r>
+            <a:endParaRPr lang="en-GB" dirty="0">
+              <a:solidFill>
+                <a:schemeClr val="accent4">
+                  <a:lumMod val="75000"/>
+                </a:schemeClr>
+              </a:solidFill>
+            </a:endParaRPr>
+          </a:p>
+        </p:txBody>
+      </p:sp>
+      <p:grpSp>
+        <p:nvGrpSpPr>
+          <p:cNvPr id="91" name="Grupo 90">
+            <a:extLst>
+              <a:ext uri="{FF2B5EF4-FFF2-40B4-BE49-F238E27FC236}">
+                <a16:creationId xmlns:a16="http://schemas.microsoft.com/office/drawing/2014/main" id="{2F1B99A0-9908-3142-0498-386DFE39DF0C}"/>
+              </a:ext>
+            </a:extLst>
+          </p:cNvPr>
+          <p:cNvGrpSpPr/>
+          <p:nvPr/>
+        </p:nvGrpSpPr>
+        <p:grpSpPr>
+          <a:xfrm>
+            <a:off x="3929140" y="2907883"/>
+            <a:ext cx="1440000" cy="1236685"/>
+            <a:chOff x="3929140" y="2907883"/>
+            <a:chExt cx="1440000" cy="1236685"/>
+          </a:xfrm>
+        </p:grpSpPr>
+        <p:sp>
+          <p:nvSpPr>
+            <p:cNvPr id="4" name="Rectángulo: esquinas redondeadas 3">
+              <a:extLst>
+                <a:ext uri="{FF2B5EF4-FFF2-40B4-BE49-F238E27FC236}">
+                  <a16:creationId xmlns:a16="http://schemas.microsoft.com/office/drawing/2014/main" id="{CF1437A7-A596-4F07-54E9-499815B6374E}"/>
+                </a:ext>
+              </a:extLst>
+            </p:cNvPr>
+            <p:cNvSpPr/>
+            <p:nvPr/>
+          </p:nvSpPr>
+          <p:spPr>
+            <a:xfrm>
+              <a:off x="3929140" y="2910282"/>
+              <a:ext cx="1440000" cy="1234286"/>
+            </a:xfrm>
+            <a:prstGeom prst="roundRect">
+              <a:avLst>
+                <a:gd name="adj" fmla="val 11953"/>
+              </a:avLst>
+            </a:prstGeom>
+            <a:solidFill>
+              <a:schemeClr val="accent6">
+                <a:lumMod val="20000"/>
+                <a:lumOff val="80000"/>
+              </a:schemeClr>
+            </a:solidFill>
+            <a:ln>
+              <a:solidFill>
+                <a:schemeClr val="accent6">
+                  <a:lumMod val="50000"/>
+                </a:schemeClr>
+              </a:solidFill>
+            </a:ln>
+          </p:spPr>
+          <p:style>
+            <a:lnRef idx="2">
+              <a:schemeClr val="accent1">
+                <a:shade val="15000"/>
+              </a:schemeClr>
+            </a:lnRef>
+            <a:fillRef idx="1">
+              <a:schemeClr val="accent1"/>
+            </a:fillRef>
+            <a:effectRef idx="0">
+              <a:schemeClr val="accent1"/>
+            </a:effectRef>
+            <a:fontRef idx="minor">
+              <a:schemeClr val="lt1"/>
+            </a:fontRef>
+          </p:style>
+          <p:txBody>
+            <a:bodyPr rtlCol="0" anchor="ctr"/>
+            <a:lstStyle/>
+            <a:p>
+              <a:pPr algn="ctr"/>
+              <a:endParaRPr lang="en-GB" dirty="0"/>
+            </a:p>
+          </p:txBody>
+        </p:sp>
+        <p:cxnSp>
+          <p:nvCxnSpPr>
+            <p:cNvPr id="6" name="Conector recto de flecha 5">
+              <a:extLst>
+                <a:ext uri="{FF2B5EF4-FFF2-40B4-BE49-F238E27FC236}">
+                  <a16:creationId xmlns:a16="http://schemas.microsoft.com/office/drawing/2014/main" id="{DF5E304C-2AD3-3799-D362-02D186DCD6C0}"/>
+                </a:ext>
+              </a:extLst>
+            </p:cNvPr>
+            <p:cNvCxnSpPr>
+              <a:cxnSpLocks/>
+              <a:endCxn id="11" idx="2"/>
+            </p:cNvCxnSpPr>
+            <p:nvPr/>
+          </p:nvCxnSpPr>
+          <p:spPr>
+            <a:xfrm>
+              <a:off x="3929140" y="3116434"/>
+              <a:ext cx="374637" cy="0"/>
+            </a:xfrm>
+            <a:prstGeom prst="straightConnector1">
+              <a:avLst/>
+            </a:prstGeom>
+            <a:ln w="12700">
+              <a:solidFill>
+                <a:schemeClr val="tx1"/>
+              </a:solidFill>
+              <a:tailEnd type="stealth" w="sm" len="sm"/>
+            </a:ln>
+          </p:spPr>
+          <p:style>
+            <a:lnRef idx="1">
+              <a:schemeClr val="accent1"/>
+            </a:lnRef>
+            <a:fillRef idx="0">
+              <a:schemeClr val="accent1"/>
+            </a:fillRef>
+            <a:effectRef idx="0">
+              <a:schemeClr val="accent1"/>
+            </a:effectRef>
+            <a:fontRef idx="minor">
+              <a:schemeClr val="tx1"/>
+            </a:fontRef>
+          </p:style>
+        </p:cxnSp>
+        <p:cxnSp>
+          <p:nvCxnSpPr>
+            <p:cNvPr id="9" name="Conector: angular 8">
+              <a:extLst>
+                <a:ext uri="{FF2B5EF4-FFF2-40B4-BE49-F238E27FC236}">
+                  <a16:creationId xmlns:a16="http://schemas.microsoft.com/office/drawing/2014/main" id="{88F6E6D8-FADF-EF60-0389-222F97E41A80}"/>
+                </a:ext>
+              </a:extLst>
+            </p:cNvPr>
+            <p:cNvCxnSpPr>
+              <a:cxnSpLocks/>
+            </p:cNvCxnSpPr>
+            <p:nvPr/>
+          </p:nvCxnSpPr>
+          <p:spPr>
+            <a:xfrm flipV="1">
+              <a:off x="3929140" y="3568568"/>
+              <a:ext cx="1037285" cy="367448"/>
+            </a:xfrm>
+            <a:prstGeom prst="bentConnector3">
+              <a:avLst>
+                <a:gd name="adj1" fmla="val 99907"/>
+              </a:avLst>
+            </a:prstGeom>
+            <a:ln w="12700">
+              <a:solidFill>
+                <a:schemeClr val="tx1"/>
+              </a:solidFill>
+              <a:tailEnd type="stealth" w="sm" len="sm"/>
+            </a:ln>
+          </p:spPr>
+          <p:style>
+            <a:lnRef idx="1">
+              <a:schemeClr val="accent1"/>
+            </a:lnRef>
+            <a:fillRef idx="0">
+              <a:schemeClr val="accent1"/>
+            </a:fillRef>
+            <a:effectRef idx="0">
+              <a:schemeClr val="accent1"/>
+            </a:effectRef>
+            <a:fontRef idx="minor">
+              <a:schemeClr val="tx1"/>
+            </a:fontRef>
+          </p:style>
+        </p:cxnSp>
+        <p:sp>
+          <p:nvSpPr>
+            <p:cNvPr id="11" name="Elipse 10">
+              <a:extLst>
+                <a:ext uri="{FF2B5EF4-FFF2-40B4-BE49-F238E27FC236}">
+                  <a16:creationId xmlns:a16="http://schemas.microsoft.com/office/drawing/2014/main" id="{8331162F-FA64-EC7E-C007-85A2F26DEE97}"/>
+                </a:ext>
+              </a:extLst>
+            </p:cNvPr>
+            <p:cNvSpPr>
+              <a:spLocks noChangeAspect="1"/>
+            </p:cNvSpPr>
+            <p:nvPr/>
+          </p:nvSpPr>
+          <p:spPr>
+            <a:xfrm>
+              <a:off x="4303777" y="3075291"/>
+              <a:ext cx="82286" cy="82286"/>
+            </a:xfrm>
+            <a:prstGeom prst="ellipse">
+              <a:avLst/>
+            </a:prstGeom>
+            <a:solidFill>
+              <a:schemeClr val="bg1"/>
+            </a:solidFill>
+            <a:ln>
+              <a:solidFill>
+                <a:schemeClr val="accent6">
+                  <a:lumMod val="50000"/>
+                </a:schemeClr>
+              </a:solidFill>
+            </a:ln>
+          </p:spPr>
+          <p:style>
+            <a:lnRef idx="2">
+              <a:schemeClr val="accent1">
+                <a:shade val="15000"/>
+              </a:schemeClr>
+            </a:lnRef>
+            <a:fillRef idx="1">
+              <a:schemeClr val="accent1"/>
+            </a:fillRef>
+            <a:effectRef idx="0">
+              <a:schemeClr val="accent1"/>
+            </a:effectRef>
+            <a:fontRef idx="minor">
+              <a:schemeClr val="lt1"/>
+            </a:fontRef>
+          </p:style>
+          <p:txBody>
+            <a:bodyPr rtlCol="0" anchor="ctr"/>
+            <a:lstStyle/>
+            <a:p>
+              <a:pPr algn="ctr"/>
+              <a:r>
+                <a:rPr lang="es-ES" sz="1000" dirty="0">
+                  <a:solidFill>
+                    <a:schemeClr val="tx1"/>
+                  </a:solidFill>
+                </a:rPr>
+                <a:t>X</a:t>
+              </a:r>
+              <a:endParaRPr lang="en-GB" sz="1000" dirty="0">
+                <a:solidFill>
+                  <a:schemeClr val="tx1"/>
+                </a:solidFill>
+              </a:endParaRPr>
+            </a:p>
+          </p:txBody>
+        </p:sp>
+        <p:sp>
+          <p:nvSpPr>
+            <p:cNvPr id="12" name="Elipse 11">
+              <a:extLst>
+                <a:ext uri="{FF2B5EF4-FFF2-40B4-BE49-F238E27FC236}">
+                  <a16:creationId xmlns:a16="http://schemas.microsoft.com/office/drawing/2014/main" id="{CA3CB8CD-9F7E-F230-97C0-D7F372A6968A}"/>
+                </a:ext>
+              </a:extLst>
+            </p:cNvPr>
+            <p:cNvSpPr>
+              <a:spLocks noChangeAspect="1"/>
+            </p:cNvSpPr>
+            <p:nvPr/>
+          </p:nvSpPr>
+          <p:spPr>
+            <a:xfrm>
+              <a:off x="4713929" y="3490225"/>
+              <a:ext cx="82286" cy="82286"/>
+            </a:xfrm>
+            <a:prstGeom prst="ellipse">
+              <a:avLst/>
+            </a:prstGeom>
+            <a:solidFill>
+              <a:schemeClr val="bg1"/>
+            </a:solidFill>
+            <a:ln>
+              <a:solidFill>
+                <a:schemeClr val="accent6">
+                  <a:lumMod val="50000"/>
+                </a:schemeClr>
+              </a:solidFill>
+            </a:ln>
+          </p:spPr>
+          <p:style>
+            <a:lnRef idx="2">
+              <a:schemeClr val="accent1">
+                <a:shade val="15000"/>
+              </a:schemeClr>
+            </a:lnRef>
+            <a:fillRef idx="1">
+              <a:schemeClr val="accent1"/>
+            </a:fillRef>
+            <a:effectRef idx="0">
+              <a:schemeClr val="accent1"/>
+            </a:effectRef>
+            <a:fontRef idx="minor">
+              <a:schemeClr val="lt1"/>
+            </a:fontRef>
+          </p:style>
+          <p:txBody>
+            <a:bodyPr rtlCol="0" anchor="ctr"/>
+            <a:lstStyle/>
+            <a:p>
+              <a:pPr algn="ctr"/>
+              <a:r>
+                <a:rPr lang="es-ES" sz="1000" dirty="0">
+                  <a:solidFill>
+                    <a:schemeClr val="tx1"/>
+                  </a:solidFill>
+                </a:rPr>
+                <a:t>X</a:t>
+              </a:r>
+              <a:endParaRPr lang="en-GB" sz="1000" dirty="0">
+                <a:solidFill>
+                  <a:schemeClr val="tx1"/>
+                </a:solidFill>
+              </a:endParaRPr>
+            </a:p>
+          </p:txBody>
+        </p:sp>
+        <p:sp>
+          <p:nvSpPr>
+            <p:cNvPr id="13" name="Elipse 12">
+              <a:extLst>
+                <a:ext uri="{FF2B5EF4-FFF2-40B4-BE49-F238E27FC236}">
+                  <a16:creationId xmlns:a16="http://schemas.microsoft.com/office/drawing/2014/main" id="{F6EE8B10-8212-F49C-4754-EC5301E898D2}"/>
+                </a:ext>
+              </a:extLst>
+            </p:cNvPr>
+            <p:cNvSpPr>
+              <a:spLocks noChangeAspect="1"/>
+            </p:cNvSpPr>
+            <p:nvPr/>
+          </p:nvSpPr>
+          <p:spPr>
+            <a:xfrm>
+              <a:off x="4716931" y="3076568"/>
+              <a:ext cx="82286" cy="82286"/>
+            </a:xfrm>
+            <a:prstGeom prst="ellipse">
+              <a:avLst/>
+            </a:prstGeom>
+            <a:solidFill>
+              <a:schemeClr val="bg1"/>
+            </a:solidFill>
+            <a:ln>
+              <a:solidFill>
+                <a:schemeClr val="accent6">
+                  <a:lumMod val="50000"/>
+                </a:schemeClr>
+              </a:solidFill>
+            </a:ln>
+          </p:spPr>
+          <p:style>
+            <a:lnRef idx="2">
+              <a:schemeClr val="accent1">
+                <a:shade val="15000"/>
+              </a:schemeClr>
+            </a:lnRef>
+            <a:fillRef idx="1">
+              <a:schemeClr val="accent1"/>
+            </a:fillRef>
+            <a:effectRef idx="0">
+              <a:schemeClr val="accent1"/>
+            </a:effectRef>
+            <a:fontRef idx="minor">
+              <a:schemeClr val="lt1"/>
+            </a:fontRef>
+          </p:style>
+          <p:txBody>
+            <a:bodyPr rtlCol="0" anchor="ctr"/>
+            <a:lstStyle/>
+            <a:p>
+              <a:pPr algn="ctr"/>
+              <a:r>
+                <a:rPr lang="es-ES" sz="1000" dirty="0">
+                  <a:solidFill>
+                    <a:schemeClr val="tx1"/>
+                  </a:solidFill>
+                </a:rPr>
+                <a:t>+</a:t>
+              </a:r>
+              <a:endParaRPr lang="en-GB" sz="1000" dirty="0">
+                <a:solidFill>
+                  <a:schemeClr val="tx1"/>
+                </a:solidFill>
+              </a:endParaRPr>
+            </a:p>
+          </p:txBody>
+        </p:sp>
+        <p:sp>
+          <p:nvSpPr>
+            <p:cNvPr id="14" name="Elipse 13">
+              <a:extLst>
+                <a:ext uri="{FF2B5EF4-FFF2-40B4-BE49-F238E27FC236}">
+                  <a16:creationId xmlns:a16="http://schemas.microsoft.com/office/drawing/2014/main" id="{FF01DD5D-9786-36F2-5529-3C2BDBCC158F}"/>
+                </a:ext>
+              </a:extLst>
+            </p:cNvPr>
+            <p:cNvSpPr>
+              <a:spLocks noChangeAspect="1"/>
+            </p:cNvSpPr>
+            <p:nvPr/>
+          </p:nvSpPr>
+          <p:spPr>
+            <a:xfrm>
+              <a:off x="4925283" y="3486282"/>
+              <a:ext cx="82286" cy="82286"/>
+            </a:xfrm>
+            <a:prstGeom prst="ellipse">
+              <a:avLst/>
+            </a:prstGeom>
+            <a:solidFill>
+              <a:schemeClr val="bg1"/>
+            </a:solidFill>
+            <a:ln>
+              <a:solidFill>
+                <a:schemeClr val="accent6">
+                  <a:lumMod val="50000"/>
+                </a:schemeClr>
+              </a:solidFill>
+            </a:ln>
+          </p:spPr>
+          <p:style>
+            <a:lnRef idx="2">
+              <a:schemeClr val="accent1">
+                <a:shade val="15000"/>
+              </a:schemeClr>
+            </a:lnRef>
+            <a:fillRef idx="1">
+              <a:schemeClr val="accent1"/>
+            </a:fillRef>
+            <a:effectRef idx="0">
+              <a:schemeClr val="accent1"/>
+            </a:effectRef>
+            <a:fontRef idx="minor">
+              <a:schemeClr val="lt1"/>
+            </a:fontRef>
+          </p:style>
+          <p:txBody>
+            <a:bodyPr rtlCol="0" anchor="ctr"/>
+            <a:lstStyle/>
+            <a:p>
+              <a:pPr algn="ctr"/>
+              <a:r>
+                <a:rPr lang="es-ES" sz="1000" dirty="0">
+                  <a:solidFill>
+                    <a:schemeClr val="tx1"/>
+                  </a:solidFill>
+                </a:rPr>
+                <a:t>X</a:t>
+              </a:r>
+              <a:endParaRPr lang="en-GB" sz="1000" dirty="0">
+                <a:solidFill>
+                  <a:schemeClr val="tx1"/>
+                </a:solidFill>
+              </a:endParaRPr>
+            </a:p>
+          </p:txBody>
+        </p:sp>
+        <p:cxnSp>
+          <p:nvCxnSpPr>
+            <p:cNvPr id="18" name="Conector recto de flecha 17">
+              <a:extLst>
+                <a:ext uri="{FF2B5EF4-FFF2-40B4-BE49-F238E27FC236}">
+                  <a16:creationId xmlns:a16="http://schemas.microsoft.com/office/drawing/2014/main" id="{A8D84320-E677-EFC1-C7FA-BCF646B9B4D5}"/>
+                </a:ext>
+              </a:extLst>
+            </p:cNvPr>
+            <p:cNvCxnSpPr>
+              <a:cxnSpLocks/>
+              <a:stCxn id="11" idx="6"/>
+              <a:endCxn id="13" idx="2"/>
+            </p:cNvCxnSpPr>
+            <p:nvPr/>
+          </p:nvCxnSpPr>
+          <p:spPr>
+            <a:xfrm>
+              <a:off x="4386063" y="3116434"/>
+              <a:ext cx="330869" cy="1277"/>
+            </a:xfrm>
+            <a:prstGeom prst="straightConnector1">
+              <a:avLst/>
+            </a:prstGeom>
+            <a:ln w="12700">
+              <a:solidFill>
+                <a:schemeClr val="tx1"/>
+              </a:solidFill>
+              <a:tailEnd type="stealth" w="sm" len="sm"/>
+            </a:ln>
+          </p:spPr>
+          <p:style>
+            <a:lnRef idx="1">
+              <a:schemeClr val="accent1"/>
+            </a:lnRef>
+            <a:fillRef idx="0">
+              <a:schemeClr val="accent1"/>
+            </a:fillRef>
+            <a:effectRef idx="0">
+              <a:schemeClr val="accent1"/>
+            </a:effectRef>
+            <a:fontRef idx="minor">
+              <a:schemeClr val="tx1"/>
+            </a:fontRef>
+          </p:style>
+        </p:cxnSp>
+        <p:cxnSp>
+          <p:nvCxnSpPr>
+            <p:cNvPr id="25" name="Conector: angular 24">
+              <a:extLst>
+                <a:ext uri="{FF2B5EF4-FFF2-40B4-BE49-F238E27FC236}">
+                  <a16:creationId xmlns:a16="http://schemas.microsoft.com/office/drawing/2014/main" id="{B8B7BD59-6167-D52E-EA8A-95FE6EDC9F22}"/>
+                </a:ext>
+              </a:extLst>
+            </p:cNvPr>
+            <p:cNvCxnSpPr>
+              <a:cxnSpLocks/>
+              <a:endCxn id="12" idx="4"/>
+            </p:cNvCxnSpPr>
+            <p:nvPr/>
+          </p:nvCxnSpPr>
+          <p:spPr>
+            <a:xfrm flipV="1">
+              <a:off x="3929140" y="3572511"/>
+              <a:ext cx="825931" cy="363505"/>
+            </a:xfrm>
+            <a:prstGeom prst="bentConnector2">
+              <a:avLst/>
+            </a:prstGeom>
+            <a:ln w="12700">
+              <a:solidFill>
+                <a:schemeClr val="tx1"/>
+              </a:solidFill>
+              <a:tailEnd type="stealth" w="sm" len="sm"/>
+            </a:ln>
+          </p:spPr>
+          <p:style>
+            <a:lnRef idx="1">
+              <a:schemeClr val="accent1"/>
+            </a:lnRef>
+            <a:fillRef idx="0">
+              <a:schemeClr val="accent1"/>
+            </a:fillRef>
+            <a:effectRef idx="0">
+              <a:schemeClr val="accent1"/>
+            </a:effectRef>
+            <a:fontRef idx="minor">
+              <a:schemeClr val="tx1"/>
+            </a:fontRef>
+          </p:style>
+        </p:cxnSp>
+        <p:cxnSp>
+          <p:nvCxnSpPr>
+            <p:cNvPr id="50" name="Conector: angular 49">
+              <a:extLst>
+                <a:ext uri="{FF2B5EF4-FFF2-40B4-BE49-F238E27FC236}">
+                  <a16:creationId xmlns:a16="http://schemas.microsoft.com/office/drawing/2014/main" id="{594BF136-71F0-5C95-9138-69BADC2AD414}"/>
+                </a:ext>
+              </a:extLst>
+            </p:cNvPr>
+            <p:cNvCxnSpPr>
+              <a:cxnSpLocks/>
+              <a:stCxn id="24" idx="3"/>
+              <a:endCxn id="11" idx="4"/>
+            </p:cNvCxnSpPr>
+            <p:nvPr/>
+          </p:nvCxnSpPr>
+          <p:spPr>
+            <a:xfrm flipV="1">
+              <a:off x="4249700" y="3157577"/>
+              <a:ext cx="95220" cy="777350"/>
+            </a:xfrm>
+            <a:prstGeom prst="bentConnector2">
+              <a:avLst/>
+            </a:prstGeom>
+            <a:ln w="12700">
+              <a:solidFill>
+                <a:schemeClr val="tx1"/>
+              </a:solidFill>
+              <a:tailEnd type="stealth" w="sm" len="sm"/>
+            </a:ln>
+          </p:spPr>
+          <p:style>
+            <a:lnRef idx="1">
+              <a:schemeClr val="accent1"/>
+            </a:lnRef>
+            <a:fillRef idx="0">
+              <a:schemeClr val="accent1"/>
+            </a:fillRef>
+            <a:effectRef idx="0">
+              <a:schemeClr val="accent1"/>
+            </a:effectRef>
+            <a:fontRef idx="minor">
+              <a:schemeClr val="tx1"/>
+            </a:fontRef>
+          </p:style>
+        </p:cxnSp>
+        <p:cxnSp>
+          <p:nvCxnSpPr>
+            <p:cNvPr id="61" name="Conector recto de flecha 60">
+              <a:extLst>
+                <a:ext uri="{FF2B5EF4-FFF2-40B4-BE49-F238E27FC236}">
+                  <a16:creationId xmlns:a16="http://schemas.microsoft.com/office/drawing/2014/main" id="{D11C6947-145E-6DA0-C2D8-3A0F726689D2}"/>
+                </a:ext>
+              </a:extLst>
+            </p:cNvPr>
+            <p:cNvCxnSpPr>
+              <a:cxnSpLocks/>
+              <a:stCxn id="12" idx="0"/>
+              <a:endCxn id="13" idx="4"/>
+            </p:cNvCxnSpPr>
+            <p:nvPr/>
+          </p:nvCxnSpPr>
+          <p:spPr>
+            <a:xfrm flipV="1">
+              <a:off x="4755071" y="3158854"/>
+              <a:ext cx="3003" cy="331371"/>
+            </a:xfrm>
+            <a:prstGeom prst="straightConnector1">
+              <a:avLst/>
+            </a:prstGeom>
+            <a:ln w="12700">
+              <a:solidFill>
+                <a:schemeClr val="tx1"/>
+              </a:solidFill>
+              <a:tailEnd type="stealth" w="sm" len="sm"/>
+            </a:ln>
+          </p:spPr>
+          <p:style>
+            <a:lnRef idx="1">
+              <a:schemeClr val="accent1"/>
+            </a:lnRef>
+            <a:fillRef idx="0">
+              <a:schemeClr val="accent1"/>
+            </a:fillRef>
+            <a:effectRef idx="0">
+              <a:schemeClr val="accent1"/>
+            </a:effectRef>
+            <a:fontRef idx="minor">
+              <a:schemeClr val="tx1"/>
+            </a:fontRef>
+          </p:style>
+        </p:cxnSp>
+        <p:cxnSp>
+          <p:nvCxnSpPr>
+            <p:cNvPr id="64" name="Conector recto de flecha 63">
+              <a:extLst>
+                <a:ext uri="{FF2B5EF4-FFF2-40B4-BE49-F238E27FC236}">
+                  <a16:creationId xmlns:a16="http://schemas.microsoft.com/office/drawing/2014/main" id="{989FA8DA-7314-E4C7-00F9-300D819A34A4}"/>
+                </a:ext>
+              </a:extLst>
+            </p:cNvPr>
+            <p:cNvCxnSpPr>
+              <a:cxnSpLocks/>
+              <a:stCxn id="13" idx="6"/>
+            </p:cNvCxnSpPr>
+            <p:nvPr/>
+          </p:nvCxnSpPr>
+          <p:spPr>
+            <a:xfrm flipV="1">
+              <a:off x="4799217" y="3116434"/>
+              <a:ext cx="569923" cy="1277"/>
+            </a:xfrm>
+            <a:prstGeom prst="straightConnector1">
+              <a:avLst/>
+            </a:prstGeom>
+            <a:ln w="12700">
+              <a:solidFill>
+                <a:schemeClr val="tx1"/>
+              </a:solidFill>
+              <a:tailEnd type="none" w="med" len="lg"/>
+            </a:ln>
+          </p:spPr>
+          <p:style>
+            <a:lnRef idx="1">
+              <a:schemeClr val="accent1"/>
+            </a:lnRef>
+            <a:fillRef idx="0">
+              <a:schemeClr val="accent1"/>
+            </a:fillRef>
+            <a:effectRef idx="0">
+              <a:schemeClr val="accent1"/>
+            </a:effectRef>
+            <a:fontRef idx="minor">
+              <a:schemeClr val="tx1"/>
+            </a:fontRef>
+          </p:style>
+        </p:cxnSp>
+        <p:cxnSp>
+          <p:nvCxnSpPr>
+            <p:cNvPr id="72" name="Conector: angular 71">
+              <a:extLst>
+                <a:ext uri="{FF2B5EF4-FFF2-40B4-BE49-F238E27FC236}">
+                  <a16:creationId xmlns:a16="http://schemas.microsoft.com/office/drawing/2014/main" id="{39D38C8C-DFBC-BD7E-3BFB-48048F989251}"/>
+                </a:ext>
+              </a:extLst>
+            </p:cNvPr>
+            <p:cNvCxnSpPr>
+              <a:cxnSpLocks/>
+              <a:stCxn id="13" idx="6"/>
+              <a:endCxn id="14" idx="0"/>
+            </p:cNvCxnSpPr>
+            <p:nvPr/>
+          </p:nvCxnSpPr>
+          <p:spPr>
+            <a:xfrm>
+              <a:off x="4799217" y="3117711"/>
+              <a:ext cx="167208" cy="368571"/>
+            </a:xfrm>
+            <a:prstGeom prst="bentConnector2">
+              <a:avLst/>
+            </a:prstGeom>
+            <a:ln w="12700">
+              <a:solidFill>
+                <a:schemeClr val="tx1"/>
+              </a:solidFill>
+              <a:tailEnd type="stealth" w="sm" len="sm"/>
+            </a:ln>
+          </p:spPr>
+          <p:style>
+            <a:lnRef idx="1">
+              <a:schemeClr val="accent1"/>
+            </a:lnRef>
+            <a:fillRef idx="0">
+              <a:schemeClr val="accent1"/>
+            </a:fillRef>
+            <a:effectRef idx="0">
+              <a:schemeClr val="accent1"/>
+            </a:effectRef>
+            <a:fontRef idx="minor">
+              <a:schemeClr val="tx1"/>
+            </a:fontRef>
+          </p:style>
+        </p:cxnSp>
+        <p:cxnSp>
+          <p:nvCxnSpPr>
+            <p:cNvPr id="80" name="Conector: angular 79">
+              <a:extLst>
+                <a:ext uri="{FF2B5EF4-FFF2-40B4-BE49-F238E27FC236}">
+                  <a16:creationId xmlns:a16="http://schemas.microsoft.com/office/drawing/2014/main" id="{C98ADCAC-EE01-2BB8-6E30-208A3D6438E9}"/>
+                </a:ext>
+              </a:extLst>
+            </p:cNvPr>
+            <p:cNvCxnSpPr>
+              <a:cxnSpLocks/>
+              <a:stCxn id="14" idx="6"/>
+            </p:cNvCxnSpPr>
+            <p:nvPr/>
+          </p:nvCxnSpPr>
+          <p:spPr>
+            <a:xfrm>
+              <a:off x="5007568" y="3527425"/>
+              <a:ext cx="361572" cy="413429"/>
+            </a:xfrm>
+            <a:prstGeom prst="bentConnector3">
+              <a:avLst>
+                <a:gd name="adj1" fmla="val 44648"/>
+              </a:avLst>
+            </a:prstGeom>
+            <a:ln w="12700">
+              <a:solidFill>
+                <a:schemeClr val="tx1"/>
+              </a:solidFill>
+              <a:tailEnd type="none" w="med" len="lg"/>
+            </a:ln>
+          </p:spPr>
+          <p:style>
+            <a:lnRef idx="1">
+              <a:schemeClr val="accent1"/>
+            </a:lnRef>
+            <a:fillRef idx="0">
+              <a:schemeClr val="accent1"/>
+            </a:fillRef>
+            <a:effectRef idx="0">
+              <a:schemeClr val="accent1"/>
+            </a:effectRef>
+            <a:fontRef idx="minor">
+              <a:schemeClr val="tx1"/>
+            </a:fontRef>
+          </p:style>
+        </p:cxnSp>
+        <p:sp>
+          <p:nvSpPr>
+            <p:cNvPr id="24" name="Rectángulo 23">
+              <a:extLst>
+                <a:ext uri="{FF2B5EF4-FFF2-40B4-BE49-F238E27FC236}">
+                  <a16:creationId xmlns:a16="http://schemas.microsoft.com/office/drawing/2014/main" id="{E477D1BE-E34C-F868-DAF8-59338C141568}"/>
+                </a:ext>
+              </a:extLst>
+            </p:cNvPr>
+            <p:cNvSpPr/>
+            <p:nvPr/>
+          </p:nvSpPr>
+          <p:spPr>
+            <a:xfrm>
+              <a:off x="4217640" y="3850288"/>
+              <a:ext cx="32060" cy="169277"/>
+            </a:xfrm>
+            <a:prstGeom prst="rect">
+              <a:avLst/>
+            </a:prstGeom>
+            <a:solidFill>
+              <a:schemeClr val="accent6">
+                <a:lumMod val="20000"/>
+                <a:lumOff val="80000"/>
+              </a:schemeClr>
+            </a:solidFill>
+            <a:ln>
+              <a:noFill/>
+            </a:ln>
+          </p:spPr>
+          <p:style>
+            <a:lnRef idx="2">
+              <a:schemeClr val="accent1">
+                <a:shade val="15000"/>
+              </a:schemeClr>
+            </a:lnRef>
+            <a:fillRef idx="1">
+              <a:schemeClr val="accent1"/>
+            </a:fillRef>
+            <a:effectRef idx="0">
+              <a:schemeClr val="accent1"/>
+            </a:effectRef>
+            <a:fontRef idx="minor">
+              <a:schemeClr val="lt1"/>
+            </a:fontRef>
+          </p:style>
+          <p:txBody>
+            <a:bodyPr wrap="none" lIns="0" tIns="0" rIns="0" bIns="0" rtlCol="0" anchor="ctr">
+              <a:spAutoFit/>
+            </a:bodyPr>
+            <a:lstStyle/>
+            <a:p>
+              <a:pPr algn="ctr"/>
+              <a:r>
+                <a:rPr lang="es-ES" sz="1100" dirty="0">
+                  <a:solidFill>
+                    <a:schemeClr val="tx1"/>
+                  </a:solidFill>
+                </a:rPr>
+                <a:t> </a:t>
+              </a:r>
+              <a:endParaRPr lang="en-GB" sz="1100" baseline="-25000" dirty="0">
+                <a:solidFill>
+                  <a:schemeClr val="tx1"/>
+                </a:solidFill>
+              </a:endParaRPr>
+            </a:p>
+          </p:txBody>
+        </p:sp>
+        <p:sp>
+          <p:nvSpPr>
+            <p:cNvPr id="42" name="Rectángulo 41">
+              <a:extLst>
+                <a:ext uri="{FF2B5EF4-FFF2-40B4-BE49-F238E27FC236}">
+                  <a16:creationId xmlns:a16="http://schemas.microsoft.com/office/drawing/2014/main" id="{17329C10-3515-240F-2F12-3E85B4EBE4F2}"/>
+                </a:ext>
+              </a:extLst>
+            </p:cNvPr>
+            <p:cNvSpPr/>
+            <p:nvPr/>
+          </p:nvSpPr>
+          <p:spPr>
+            <a:xfrm>
+              <a:off x="4624099" y="3647101"/>
+              <a:ext cx="261290" cy="169277"/>
+            </a:xfrm>
+            <a:prstGeom prst="rect">
+              <a:avLst/>
+            </a:prstGeom>
+            <a:solidFill>
+              <a:schemeClr val="accent6">
+                <a:lumMod val="20000"/>
+                <a:lumOff val="80000"/>
+              </a:schemeClr>
+            </a:solidFill>
+            <a:ln>
+              <a:noFill/>
+            </a:ln>
+          </p:spPr>
+          <p:style>
+            <a:lnRef idx="2">
+              <a:schemeClr val="accent1">
+                <a:shade val="15000"/>
+              </a:schemeClr>
+            </a:lnRef>
+            <a:fillRef idx="1">
+              <a:schemeClr val="accent1"/>
+            </a:fillRef>
+            <a:effectRef idx="0">
+              <a:schemeClr val="accent1"/>
+            </a:effectRef>
+            <a:fontRef idx="minor">
+              <a:schemeClr val="lt1"/>
+            </a:fontRef>
+          </p:style>
+          <p:txBody>
+            <a:bodyPr wrap="none" lIns="0" tIns="0" rIns="0" bIns="0" rtlCol="0" anchor="ctr">
+              <a:spAutoFit/>
+            </a:bodyPr>
+            <a:lstStyle/>
+            <a:p>
+              <a:pPr algn="ctr"/>
+              <a:r>
+                <a:rPr lang="es-ES" sz="1100" dirty="0" err="1">
+                  <a:solidFill>
+                    <a:schemeClr val="tx1"/>
+                  </a:solidFill>
+                </a:rPr>
+                <a:t>tanh</a:t>
+              </a:r>
+              <a:endParaRPr lang="en-GB" sz="1100" dirty="0">
+                <a:solidFill>
+                  <a:schemeClr val="tx1"/>
+                </a:solidFill>
+              </a:endParaRPr>
+            </a:p>
+          </p:txBody>
+        </p:sp>
+        <p:sp>
+          <p:nvSpPr>
+            <p:cNvPr id="43" name="Rectángulo 42">
+              <a:extLst>
+                <a:ext uri="{FF2B5EF4-FFF2-40B4-BE49-F238E27FC236}">
+                  <a16:creationId xmlns:a16="http://schemas.microsoft.com/office/drawing/2014/main" id="{60046A8A-0BDA-D7EF-77BC-98CA3E2B7664}"/>
+                </a:ext>
+              </a:extLst>
+            </p:cNvPr>
+            <p:cNvSpPr/>
+            <p:nvPr/>
+          </p:nvSpPr>
+          <p:spPr>
+            <a:xfrm>
+              <a:off x="4931960" y="3654795"/>
+              <a:ext cx="68930" cy="153888"/>
+            </a:xfrm>
+            <a:prstGeom prst="rect">
+              <a:avLst/>
+            </a:prstGeom>
+            <a:solidFill>
+              <a:schemeClr val="accent6">
+                <a:lumMod val="20000"/>
+                <a:lumOff val="80000"/>
+              </a:schemeClr>
+            </a:solidFill>
+            <a:ln>
+              <a:noFill/>
+            </a:ln>
+          </p:spPr>
+          <p:style>
+            <a:lnRef idx="2">
+              <a:schemeClr val="accent1">
+                <a:shade val="15000"/>
+              </a:schemeClr>
+            </a:lnRef>
+            <a:fillRef idx="1">
+              <a:schemeClr val="accent1"/>
+            </a:fillRef>
+            <a:effectRef idx="0">
+              <a:schemeClr val="accent1"/>
+            </a:effectRef>
+            <a:fontRef idx="minor">
+              <a:schemeClr val="lt1"/>
+            </a:fontRef>
+          </p:style>
+          <p:txBody>
+            <a:bodyPr wrap="none" lIns="0" tIns="0" rIns="0" bIns="0" rtlCol="0" anchor="ctr">
+              <a:spAutoFit/>
+            </a:bodyPr>
+            <a:lstStyle/>
+            <a:p>
+              <a:pPr algn="ctr"/>
+              <a:r>
+                <a:rPr lang="el-GR" sz="1000" dirty="0">
+                  <a:solidFill>
+                    <a:schemeClr val="tx1"/>
+                  </a:solidFill>
+                </a:rPr>
+                <a:t>σ</a:t>
+              </a:r>
+              <a:endParaRPr lang="en-GB" sz="1000" dirty="0">
+                <a:solidFill>
+                  <a:schemeClr val="tx1"/>
+                </a:solidFill>
+              </a:endParaRPr>
+            </a:p>
+          </p:txBody>
+        </p:sp>
+        <p:sp>
+          <p:nvSpPr>
+            <p:cNvPr id="44" name="Rectángulo 43">
+              <a:extLst>
+                <a:ext uri="{FF2B5EF4-FFF2-40B4-BE49-F238E27FC236}">
+                  <a16:creationId xmlns:a16="http://schemas.microsoft.com/office/drawing/2014/main" id="{280CD397-4747-C635-4423-E406E1D831F4}"/>
+                </a:ext>
+              </a:extLst>
+            </p:cNvPr>
+            <p:cNvSpPr/>
+            <p:nvPr/>
+          </p:nvSpPr>
+          <p:spPr>
+            <a:xfrm>
+              <a:off x="4835781" y="3228188"/>
+              <a:ext cx="261290" cy="169277"/>
+            </a:xfrm>
+            <a:prstGeom prst="rect">
+              <a:avLst/>
+            </a:prstGeom>
+            <a:solidFill>
+              <a:schemeClr val="accent6">
+                <a:lumMod val="20000"/>
+                <a:lumOff val="80000"/>
+              </a:schemeClr>
+            </a:solidFill>
+            <a:ln>
+              <a:noFill/>
+            </a:ln>
+          </p:spPr>
+          <p:style>
+            <a:lnRef idx="2">
+              <a:schemeClr val="accent1">
+                <a:shade val="15000"/>
+              </a:schemeClr>
+            </a:lnRef>
+            <a:fillRef idx="1">
+              <a:schemeClr val="accent1"/>
+            </a:fillRef>
+            <a:effectRef idx="0">
+              <a:schemeClr val="accent1"/>
+            </a:effectRef>
+            <a:fontRef idx="minor">
+              <a:schemeClr val="lt1"/>
+            </a:fontRef>
+          </p:style>
+          <p:txBody>
+            <a:bodyPr wrap="none" lIns="0" tIns="0" rIns="0" bIns="0" rtlCol="0" anchor="ctr">
+              <a:spAutoFit/>
+            </a:bodyPr>
+            <a:lstStyle/>
+            <a:p>
+              <a:pPr algn="ctr"/>
+              <a:r>
+                <a:rPr lang="es-ES" sz="1100" dirty="0" err="1">
+                  <a:solidFill>
+                    <a:schemeClr val="tx1"/>
+                  </a:solidFill>
+                </a:rPr>
+                <a:t>tanh</a:t>
+              </a:r>
+              <a:endParaRPr lang="en-GB" sz="1100" dirty="0">
+                <a:solidFill>
+                  <a:schemeClr val="tx1"/>
+                </a:solidFill>
+              </a:endParaRPr>
+            </a:p>
+          </p:txBody>
+        </p:sp>
+        <p:cxnSp>
+          <p:nvCxnSpPr>
+            <p:cNvPr id="74" name="Conector: angular 73">
+              <a:extLst>
+                <a:ext uri="{FF2B5EF4-FFF2-40B4-BE49-F238E27FC236}">
+                  <a16:creationId xmlns:a16="http://schemas.microsoft.com/office/drawing/2014/main" id="{DF6F2063-03CA-D525-70EC-6EF6371A777E}"/>
+                </a:ext>
+              </a:extLst>
+            </p:cNvPr>
+            <p:cNvCxnSpPr>
+              <a:cxnSpLocks/>
+              <a:stCxn id="14" idx="6"/>
+            </p:cNvCxnSpPr>
+            <p:nvPr/>
+          </p:nvCxnSpPr>
+          <p:spPr>
+            <a:xfrm>
+              <a:off x="5007569" y="3527425"/>
+              <a:ext cx="161331" cy="617143"/>
+            </a:xfrm>
+            <a:prstGeom prst="bentConnector2">
+              <a:avLst/>
+            </a:prstGeom>
+            <a:ln w="12700">
+              <a:solidFill>
+                <a:schemeClr val="tx1"/>
+              </a:solidFill>
+              <a:tailEnd type="none" w="med" len="lg"/>
+            </a:ln>
+          </p:spPr>
+          <p:style>
+            <a:lnRef idx="1">
+              <a:schemeClr val="accent1"/>
+            </a:lnRef>
+            <a:fillRef idx="0">
+              <a:schemeClr val="accent1"/>
+            </a:fillRef>
+            <a:effectRef idx="0">
+              <a:schemeClr val="accent1"/>
+            </a:effectRef>
+            <a:fontRef idx="minor">
+              <a:schemeClr val="tx1"/>
+            </a:fontRef>
+          </p:style>
+        </p:cxnSp>
+        <p:cxnSp>
+          <p:nvCxnSpPr>
+            <p:cNvPr id="82" name="Conector: angular 81">
+              <a:extLst>
+                <a:ext uri="{FF2B5EF4-FFF2-40B4-BE49-F238E27FC236}">
+                  <a16:creationId xmlns:a16="http://schemas.microsoft.com/office/drawing/2014/main" id="{7960F2C7-1FC2-0087-3341-9D1233F6EECF}"/>
+                </a:ext>
+              </a:extLst>
+            </p:cNvPr>
+            <p:cNvCxnSpPr>
+              <a:cxnSpLocks/>
+              <a:endCxn id="24" idx="1"/>
+            </p:cNvCxnSpPr>
+            <p:nvPr/>
+          </p:nvCxnSpPr>
+          <p:spPr>
+            <a:xfrm rot="16200000" flipH="1">
+              <a:off x="3671065" y="3388351"/>
+              <a:ext cx="1027043" cy="66108"/>
+            </a:xfrm>
+            <a:prstGeom prst="bentConnector2">
+              <a:avLst/>
+            </a:prstGeom>
+            <a:ln w="12700">
+              <a:solidFill>
+                <a:schemeClr val="tx1"/>
+              </a:solidFill>
+              <a:tailEnd type="none" w="sm" len="sm"/>
+            </a:ln>
+          </p:spPr>
+          <p:style>
+            <a:lnRef idx="1">
+              <a:schemeClr val="accent1"/>
+            </a:lnRef>
+            <a:fillRef idx="0">
+              <a:schemeClr val="accent1"/>
+            </a:fillRef>
+            <a:effectRef idx="0">
+              <a:schemeClr val="accent1"/>
+            </a:effectRef>
+            <a:fontRef idx="minor">
+              <a:schemeClr val="tx1"/>
+            </a:fontRef>
+          </p:style>
+        </p:cxnSp>
+        <p:cxnSp>
+          <p:nvCxnSpPr>
+            <p:cNvPr id="46" name="Conector: angular 45">
+              <a:extLst>
+                <a:ext uri="{FF2B5EF4-FFF2-40B4-BE49-F238E27FC236}">
+                  <a16:creationId xmlns:a16="http://schemas.microsoft.com/office/drawing/2014/main" id="{4CFB91D7-C914-4AD9-712C-539CC98D96E5}"/>
+                </a:ext>
+              </a:extLst>
+            </p:cNvPr>
+            <p:cNvCxnSpPr>
+              <a:cxnSpLocks/>
+              <a:endCxn id="12" idx="2"/>
+            </p:cNvCxnSpPr>
+            <p:nvPr/>
+          </p:nvCxnSpPr>
+          <p:spPr>
+            <a:xfrm flipV="1">
+              <a:off x="3929140" y="3531368"/>
+              <a:ext cx="784789" cy="404648"/>
+            </a:xfrm>
+            <a:prstGeom prst="bentConnector3">
+              <a:avLst>
+                <a:gd name="adj1" fmla="val 78667"/>
+              </a:avLst>
+            </a:prstGeom>
+            <a:ln w="12700">
+              <a:solidFill>
+                <a:schemeClr val="tx1"/>
+              </a:solidFill>
+              <a:tailEnd type="stealth" w="sm" len="sm"/>
+            </a:ln>
+          </p:spPr>
+          <p:style>
+            <a:lnRef idx="1">
+              <a:schemeClr val="accent1"/>
+            </a:lnRef>
+            <a:fillRef idx="0">
+              <a:schemeClr val="accent1"/>
+            </a:fillRef>
+            <a:effectRef idx="0">
+              <a:schemeClr val="accent1"/>
+            </a:effectRef>
+            <a:fontRef idx="minor">
+              <a:schemeClr val="tx1"/>
+            </a:fontRef>
+          </p:style>
+        </p:cxnSp>
+        <p:sp>
+          <p:nvSpPr>
+            <p:cNvPr id="41" name="Rectángulo 40">
+              <a:extLst>
+                <a:ext uri="{FF2B5EF4-FFF2-40B4-BE49-F238E27FC236}">
+                  <a16:creationId xmlns:a16="http://schemas.microsoft.com/office/drawing/2014/main" id="{6BF8DABC-0560-FDCD-1E18-56314BB886AE}"/>
+                </a:ext>
+              </a:extLst>
+            </p:cNvPr>
+            <p:cNvSpPr/>
+            <p:nvPr/>
+          </p:nvSpPr>
+          <p:spPr>
+            <a:xfrm>
+              <a:off x="4513101" y="3654795"/>
+              <a:ext cx="68930" cy="153888"/>
+            </a:xfrm>
+            <a:prstGeom prst="rect">
+              <a:avLst/>
+            </a:prstGeom>
+            <a:solidFill>
+              <a:schemeClr val="accent6">
+                <a:lumMod val="20000"/>
+                <a:lumOff val="80000"/>
+              </a:schemeClr>
+            </a:solidFill>
+            <a:ln>
+              <a:noFill/>
+            </a:ln>
+          </p:spPr>
+          <p:style>
+            <a:lnRef idx="2">
+              <a:schemeClr val="accent1">
+                <a:shade val="15000"/>
+              </a:schemeClr>
+            </a:lnRef>
+            <a:fillRef idx="1">
+              <a:schemeClr val="accent1"/>
+            </a:fillRef>
+            <a:effectRef idx="0">
+              <a:schemeClr val="accent1"/>
+            </a:effectRef>
+            <a:fontRef idx="minor">
+              <a:schemeClr val="lt1"/>
+            </a:fontRef>
+          </p:style>
+          <p:txBody>
+            <a:bodyPr wrap="none" lIns="0" tIns="0" rIns="0" bIns="0" rtlCol="0" anchor="ctr">
+              <a:spAutoFit/>
+            </a:bodyPr>
+            <a:lstStyle/>
+            <a:p>
+              <a:pPr algn="ctr"/>
+              <a:r>
+                <a:rPr lang="el-GR" sz="1000" dirty="0">
+                  <a:solidFill>
+                    <a:schemeClr val="tx1"/>
+                  </a:solidFill>
+                </a:rPr>
+                <a:t>σ</a:t>
+              </a:r>
+              <a:endParaRPr lang="en-GB" sz="1000" dirty="0">
+                <a:solidFill>
+                  <a:schemeClr val="tx1"/>
+                </a:solidFill>
+              </a:endParaRPr>
+            </a:p>
+          </p:txBody>
+        </p:sp>
+        <p:sp>
+          <p:nvSpPr>
+            <p:cNvPr id="90" name="Rectángulo 89">
+              <a:extLst>
+                <a:ext uri="{FF2B5EF4-FFF2-40B4-BE49-F238E27FC236}">
+                  <a16:creationId xmlns:a16="http://schemas.microsoft.com/office/drawing/2014/main" id="{C87EA8B1-69F9-4883-B492-2A901E4E14CC}"/>
+                </a:ext>
+              </a:extLst>
+            </p:cNvPr>
+            <p:cNvSpPr/>
+            <p:nvPr/>
+          </p:nvSpPr>
+          <p:spPr>
+            <a:xfrm>
+              <a:off x="4310456" y="3647101"/>
+              <a:ext cx="68930" cy="153888"/>
+            </a:xfrm>
+            <a:prstGeom prst="rect">
+              <a:avLst/>
+            </a:prstGeom>
+            <a:solidFill>
+              <a:schemeClr val="accent6">
+                <a:lumMod val="20000"/>
+                <a:lumOff val="80000"/>
+              </a:schemeClr>
+            </a:solidFill>
+            <a:ln>
+              <a:noFill/>
+            </a:ln>
+          </p:spPr>
+          <p:style>
+            <a:lnRef idx="2">
+              <a:schemeClr val="accent1">
+                <a:shade val="15000"/>
+              </a:schemeClr>
+            </a:lnRef>
+            <a:fillRef idx="1">
+              <a:schemeClr val="accent1"/>
+            </a:fillRef>
+            <a:effectRef idx="0">
+              <a:schemeClr val="accent1"/>
+            </a:effectRef>
+            <a:fontRef idx="minor">
+              <a:schemeClr val="lt1"/>
+            </a:fontRef>
+          </p:style>
+          <p:txBody>
+            <a:bodyPr wrap="none" lIns="0" tIns="0" rIns="0" bIns="0" rtlCol="0" anchor="ctr">
+              <a:spAutoFit/>
+            </a:bodyPr>
+            <a:lstStyle/>
+            <a:p>
+              <a:pPr algn="ctr"/>
+              <a:r>
+                <a:rPr lang="el-GR" sz="1000" dirty="0">
+                  <a:solidFill>
+                    <a:schemeClr val="tx1"/>
+                  </a:solidFill>
+                </a:rPr>
+                <a:t>σ</a:t>
+              </a:r>
+              <a:endParaRPr lang="en-GB" sz="1000" dirty="0">
+                <a:solidFill>
+                  <a:schemeClr val="tx1"/>
+                </a:solidFill>
+              </a:endParaRPr>
+            </a:p>
+          </p:txBody>
+        </p:sp>
+      </p:grpSp>
+    </p:spTree>
+    <p:extLst>
+      <p:ext uri="{BB962C8B-B14F-4D97-AF65-F5344CB8AC3E}">
+        <p14:creationId xmlns:p14="http://schemas.microsoft.com/office/powerpoint/2010/main" val="3351513696"/>
       </p:ext>
     </p:extLst>
   </p:cSld>

</xml_diff>